<commit_message>
feat: Session slides (1 and 2)
</commit_message>
<xml_diff>
--- a/documentation/Session 1.pptx
+++ b/documentation/Session 1.pptx
@@ -866,101 +866,6 @@
             <a:noAutofit/>
           </a:bodyPr>
           <a:lstStyle/>
-          <a:p>
-            <a:pPr marL="0" lvl="0" indent="0" algn="l" rtl="0">
-              <a:spcBef>
-                <a:spcPts val="0"/>
-              </a:spcBef>
-              <a:spcAft>
-                <a:spcPts val="0"/>
-              </a:spcAft>
-              <a:buNone/>
-            </a:pPr>
-            <a:r>
-              <a:rPr lang="en-US" dirty="0" err="1"/>
-              <a:t>Questionst</a:t>
-            </a:r>
-            <a:r>
-              <a:rPr lang="en-US" dirty="0"/>
-              <a:t> to Organizers:</a:t>
-            </a:r>
-          </a:p>
-          <a:p>
-            <a:pPr marL="0" lvl="0" indent="0" algn="l" rtl="0">
-              <a:spcBef>
-                <a:spcPts val="0"/>
-              </a:spcBef>
-              <a:spcAft>
-                <a:spcPts val="0"/>
-              </a:spcAft>
-              <a:buNone/>
-            </a:pPr>
-            <a:endParaRPr lang="en-US" dirty="0"/>
-          </a:p>
-          <a:p>
-            <a:pPr marL="171450" lvl="0" indent="-171450" algn="l" rtl="0">
-              <a:spcBef>
-                <a:spcPts val="0"/>
-              </a:spcBef>
-              <a:spcAft>
-                <a:spcPts val="0"/>
-              </a:spcAft>
-              <a:buFontTx/>
-              <a:buChar char="-"/>
-            </a:pPr>
-            <a:r>
-              <a:rPr lang="en-US" dirty="0"/>
-              <a:t>Make sure I am host</a:t>
-            </a:r>
-          </a:p>
-          <a:p>
-            <a:pPr marL="171450" lvl="0" indent="-171450" algn="l" rtl="0">
-              <a:spcBef>
-                <a:spcPts val="0"/>
-              </a:spcBef>
-              <a:spcAft>
-                <a:spcPts val="0"/>
-              </a:spcAft>
-              <a:buFontTx/>
-              <a:buChar char="-"/>
-            </a:pPr>
-            <a:r>
-              <a:rPr lang="en-US" dirty="0"/>
-              <a:t>Make sure we have a second host</a:t>
-            </a:r>
-          </a:p>
-          <a:p>
-            <a:pPr marL="171450" lvl="0" indent="-171450" algn="l" rtl="0">
-              <a:spcBef>
-                <a:spcPts val="0"/>
-              </a:spcBef>
-              <a:spcAft>
-                <a:spcPts val="0"/>
-              </a:spcAft>
-              <a:buFontTx/>
-              <a:buChar char="-"/>
-            </a:pPr>
-            <a:r>
-              <a:rPr lang="en-US" dirty="0"/>
-              <a:t>How many participants</a:t>
-            </a:r>
-          </a:p>
-          <a:p>
-            <a:pPr marL="171450" lvl="0" indent="-171450" algn="l" rtl="0">
-              <a:spcBef>
-                <a:spcPts val="0"/>
-              </a:spcBef>
-              <a:spcAft>
-                <a:spcPts val="0"/>
-              </a:spcAft>
-              <a:buFontTx/>
-              <a:buChar char="-"/>
-            </a:pPr>
-            <a:r>
-              <a:rPr lang="en-US" dirty="0"/>
-              <a:t>No programming</a:t>
-            </a:r>
-          </a:p>
           <a:p>
             <a:pPr marL="171450" lvl="0" indent="-171450" algn="l" rtl="0">
               <a:spcBef>
@@ -12117,11 +12022,11 @@
   <p:clrMapOvr>
     <a:masterClrMapping/>
   </p:clrMapOvr>
-  <mc:AlternateContent xmlns:mc="http://schemas.openxmlformats.org/markup-compatibility/2006">
-    <mc:Choice xmlns:p14="http://schemas.microsoft.com/office/powerpoint/2010/main" Requires="p14">
+  <mc:AlternateContent xmlns:mc="http://schemas.openxmlformats.org/markup-compatibility/2006" xmlns:p14="http://schemas.microsoft.com/office/powerpoint/2010/main">
+    <mc:Choice Requires="p14">
       <p:transition p14:dur="10" advClick="0"/>
     </mc:Choice>
-    <mc:Fallback>
+    <mc:Fallback xmlns="">
       <p:transition advClick="0"/>
     </mc:Fallback>
   </mc:AlternateContent>
@@ -14064,11 +13969,11 @@
   <p:clrMapOvr>
     <a:masterClrMapping/>
   </p:clrMapOvr>
-  <mc:AlternateContent xmlns:mc="http://schemas.openxmlformats.org/markup-compatibility/2006">
-    <mc:Choice xmlns:p14="http://schemas.microsoft.com/office/powerpoint/2010/main" Requires="p14">
+  <mc:AlternateContent xmlns:mc="http://schemas.openxmlformats.org/markup-compatibility/2006" xmlns:p14="http://schemas.microsoft.com/office/powerpoint/2010/main">
+    <mc:Choice Requires="p14">
       <p:transition p14:dur="10"/>
     </mc:Choice>
-    <mc:Fallback>
+    <mc:Fallback xmlns="">
       <p:transition/>
     </mc:Fallback>
   </mc:AlternateContent>
@@ -15959,11 +15864,11 @@
   <p:clrMapOvr>
     <a:masterClrMapping/>
   </p:clrMapOvr>
-  <mc:AlternateContent xmlns:mc="http://schemas.openxmlformats.org/markup-compatibility/2006">
-    <mc:Choice xmlns:p14="http://schemas.microsoft.com/office/powerpoint/2010/main" Requires="p14">
+  <mc:AlternateContent xmlns:mc="http://schemas.openxmlformats.org/markup-compatibility/2006" xmlns:p14="http://schemas.microsoft.com/office/powerpoint/2010/main">
+    <mc:Choice Requires="p14">
       <p:transition p14:dur="10" advClick="0"/>
     </mc:Choice>
-    <mc:Fallback>
+    <mc:Fallback xmlns="">
       <p:transition advClick="0"/>
     </mc:Fallback>
   </mc:AlternateContent>
@@ -17972,11 +17877,11 @@
   <p:clrMapOvr>
     <a:masterClrMapping/>
   </p:clrMapOvr>
-  <mc:AlternateContent xmlns:mc="http://schemas.openxmlformats.org/markup-compatibility/2006">
-    <mc:Choice xmlns:p14="http://schemas.microsoft.com/office/powerpoint/2010/main" Requires="p14">
+  <mc:AlternateContent xmlns:mc="http://schemas.openxmlformats.org/markup-compatibility/2006" xmlns:p14="http://schemas.microsoft.com/office/powerpoint/2010/main">
+    <mc:Choice Requires="p14">
       <p:transition p14:dur="10"/>
     </mc:Choice>
-    <mc:Fallback>
+    <mc:Fallback xmlns="">
       <p:transition/>
     </mc:Fallback>
   </mc:AlternateContent>
@@ -19884,11 +19789,11 @@
   <p:clrMapOvr>
     <a:masterClrMapping/>
   </p:clrMapOvr>
-  <mc:AlternateContent xmlns:mc="http://schemas.openxmlformats.org/markup-compatibility/2006">
-    <mc:Choice xmlns:p14="http://schemas.microsoft.com/office/powerpoint/2010/main" Requires="p14">
+  <mc:AlternateContent xmlns:mc="http://schemas.openxmlformats.org/markup-compatibility/2006" xmlns:p14="http://schemas.microsoft.com/office/powerpoint/2010/main">
+    <mc:Choice Requires="p14">
       <p:transition p14:dur="0" advClick="0"/>
     </mc:Choice>
-    <mc:Fallback>
+    <mc:Fallback xmlns="">
       <p:transition advClick="0"/>
     </mc:Fallback>
   </mc:AlternateContent>
@@ -21560,11 +21465,11 @@
   <p:clrMapOvr>
     <a:masterClrMapping/>
   </p:clrMapOvr>
-  <mc:AlternateContent xmlns:mc="http://schemas.openxmlformats.org/markup-compatibility/2006">
-    <mc:Choice xmlns:p14="http://schemas.microsoft.com/office/powerpoint/2010/main" Requires="p14">
+  <mc:AlternateContent xmlns:mc="http://schemas.openxmlformats.org/markup-compatibility/2006" xmlns:p14="http://schemas.microsoft.com/office/powerpoint/2010/main">
+    <mc:Choice Requires="p14">
       <p:transition p14:dur="10"/>
     </mc:Choice>
-    <mc:Fallback>
+    <mc:Fallback xmlns="">
       <p:transition/>
     </mc:Fallback>
   </mc:AlternateContent>
@@ -22154,11 +22059,11 @@
   <p:clrMapOvr>
     <a:masterClrMapping/>
   </p:clrMapOvr>
-  <mc:AlternateContent xmlns:mc="http://schemas.openxmlformats.org/markup-compatibility/2006">
-    <mc:Choice xmlns:p14="http://schemas.microsoft.com/office/powerpoint/2010/main" Requires="p14">
+  <mc:AlternateContent xmlns:mc="http://schemas.openxmlformats.org/markup-compatibility/2006" xmlns:p14="http://schemas.microsoft.com/office/powerpoint/2010/main">
+    <mc:Choice Requires="p14">
       <p:transition p14:dur="10"/>
     </mc:Choice>
-    <mc:Fallback>
+    <mc:Fallback xmlns="">
       <p:transition/>
     </mc:Fallback>
   </mc:AlternateContent>
@@ -23854,11 +23759,11 @@
   <p:clrMapOvr>
     <a:masterClrMapping/>
   </p:clrMapOvr>
-  <mc:AlternateContent xmlns:mc="http://schemas.openxmlformats.org/markup-compatibility/2006">
-    <mc:Choice xmlns:p14="http://schemas.microsoft.com/office/powerpoint/2010/main" Requires="p14">
+  <mc:AlternateContent xmlns:mc="http://schemas.openxmlformats.org/markup-compatibility/2006" xmlns:p14="http://schemas.microsoft.com/office/powerpoint/2010/main">
+    <mc:Choice Requires="p14">
       <p:transition p14:dur="0" advClick="0"/>
     </mc:Choice>
-    <mc:Fallback>
+    <mc:Fallback xmlns="">
       <p:transition advClick="0"/>
     </mc:Fallback>
   </mc:AlternateContent>
@@ -28391,11 +28296,11 @@
   <p:clrMapOvr>
     <a:masterClrMapping/>
   </p:clrMapOvr>
-  <mc:AlternateContent xmlns:mc="http://schemas.openxmlformats.org/markup-compatibility/2006">
-    <mc:Choice xmlns:p14="http://schemas.microsoft.com/office/powerpoint/2010/main" Requires="p14">
+  <mc:AlternateContent xmlns:mc="http://schemas.openxmlformats.org/markup-compatibility/2006" xmlns:p14="http://schemas.microsoft.com/office/powerpoint/2010/main">
+    <mc:Choice Requires="p14">
       <p:transition p14:dur="10"/>
     </mc:Choice>
-    <mc:Fallback>
+    <mc:Fallback xmlns="">
       <p:transition/>
     </mc:Fallback>
   </mc:AlternateContent>

</xml_diff>

<commit_message>
fix: minor updates on slides
</commit_message>
<xml_diff>
--- a/documentation/Session 1.pptx
+++ b/documentation/Session 1.pptx
@@ -24719,13 +24719,13 @@
   <p:clrMapOvr>
     <a:masterClrMapping/>
   </p:clrMapOvr>
-  <mc:AlternateContent xmlns:mc="http://schemas.openxmlformats.org/markup-compatibility/2006">
-    <mc:Choice xmlns:p14="http://schemas.microsoft.com/office/powerpoint/2010/main" Requires="p14">
+  <mc:AlternateContent xmlns:mc="http://schemas.openxmlformats.org/markup-compatibility/2006" xmlns:p14="http://schemas.microsoft.com/office/powerpoint/2010/main">
+    <mc:Choice Requires="p14">
       <p:transition spd="slow" p14:dur="800">
         <p14:flythrough dir="out"/>
       </p:transition>
     </mc:Choice>
-    <mc:Fallback>
+    <mc:Fallback xmlns="">
       <p:transition spd="slow">
         <p:fade/>
       </p:transition>
@@ -25612,7 +25612,7 @@
             <a:pPr marL="114300" indent="0">
               <a:buNone/>
             </a:pPr>
-            <a:endParaRPr lang="en-US" sz="2200" dirty="0">
+            <a:endParaRPr lang="en-US" sz="1000" dirty="0">
               <a:solidFill>
                 <a:schemeClr val="tx1"/>
               </a:solidFill>
@@ -25635,7 +25635,7 @@
             <a:pPr marL="114300" lvl="0" indent="0">
               <a:buNone/>
             </a:pPr>
-            <a:endParaRPr lang="en-US" sz="2200" dirty="0">
+            <a:endParaRPr lang="en-US" sz="1000" dirty="0">
               <a:solidFill>
                 <a:schemeClr val="tx1"/>
               </a:solidFill>
@@ -25680,6 +25680,29 @@
                 </a:solidFill>
               </a:rPr>
               <a:t>Specific libraries</a:t>
+            </a:r>
+          </a:p>
+          <a:p>
+            <a:pPr marL="114300" lvl="0" indent="0">
+              <a:buNone/>
+            </a:pPr>
+            <a:endParaRPr lang="en-US" sz="1000" dirty="0">
+              <a:solidFill>
+                <a:schemeClr val="tx1"/>
+              </a:solidFill>
+            </a:endParaRPr>
+          </a:p>
+          <a:p>
+            <a:pPr marL="114300" lvl="0" indent="0">
+              <a:buNone/>
+            </a:pPr>
+            <a:r>
+              <a:rPr lang="en-US" sz="2200" dirty="0">
+                <a:solidFill>
+                  <a:schemeClr val="tx1"/>
+                </a:solidFill>
+              </a:rPr>
+              <a:t>We will take attendance</a:t>
             </a:r>
           </a:p>
         </p:txBody>
@@ -26005,6 +26028,55 @@
                                           <p:spTgt spid="97">
                                             <p:txEl>
                                               <p:pRg st="8" end="8"/>
+                                            </p:txEl>
+                                          </p:spTgt>
+                                        </p:tgtEl>
+                                        <p:attrNameLst>
+                                          <p:attrName>style.visibility</p:attrName>
+                                        </p:attrNameLst>
+                                      </p:cBhvr>
+                                      <p:to>
+                                        <p:strVal val="visible"/>
+                                      </p:to>
+                                    </p:set>
+                                  </p:childTnLst>
+                                </p:cTn>
+                              </p:par>
+                            </p:childTnLst>
+                          </p:cTn>
+                        </p:par>
+                      </p:childTnLst>
+                    </p:cTn>
+                  </p:par>
+                  <p:par>
+                    <p:cTn id="23" fill="hold">
+                      <p:stCondLst>
+                        <p:cond delay="indefinite"/>
+                      </p:stCondLst>
+                      <p:childTnLst>
+                        <p:par>
+                          <p:cTn id="24" fill="hold">
+                            <p:stCondLst>
+                              <p:cond delay="0"/>
+                            </p:stCondLst>
+                            <p:childTnLst>
+                              <p:par>
+                                <p:cTn id="25" presetID="1" presetClass="entr" presetSubtype="0" fill="hold" nodeType="clickEffect">
+                                  <p:stCondLst>
+                                    <p:cond delay="0"/>
+                                  </p:stCondLst>
+                                  <p:childTnLst>
+                                    <p:set>
+                                      <p:cBhvr>
+                                        <p:cTn id="26" dur="1" fill="hold">
+                                          <p:stCondLst>
+                                            <p:cond delay="0"/>
+                                          </p:stCondLst>
+                                        </p:cTn>
+                                        <p:tgtEl>
+                                          <p:spTgt spid="97">
+                                            <p:txEl>
+                                              <p:pRg st="10" end="10"/>
                                             </p:txEl>
                                           </p:spTgt>
                                         </p:tgtEl>

</xml_diff>

<commit_message>
fix: minor changes in slides for the coming semesters
</commit_message>
<xml_diff>
--- a/documentation/Session 1.pptx
+++ b/documentation/Session 1.pptx
@@ -1744,7 +1744,15 @@
             </a:r>
             <a:r>
               <a:rPr lang="en-US" dirty="0"/>
-              <a:t>. This is an online environment that lets you edit and execute Python files and Jupiter notebooks. It comes with a generous teaching plan that gives you access to a cloud server that should be sufficient for small-scale machine learning projects. </a:t>
+              <a:t>. This is an online environment that lets you edit and execute Python files and Jupiter notebooks. It comes with a </a:t>
+            </a:r>
+            <a:r>
+              <a:rPr lang="en-US"/>
+              <a:t>free plan </a:t>
+            </a:r>
+            <a:r>
+              <a:rPr lang="en-US" dirty="0"/>
+              <a:t>that gives you access to a cloud server that should be sufficient for small-scale machine learning projects. </a:t>
             </a:r>
           </a:p>
           <a:p>

</xml_diff>